<commit_message>
document session 1 pcb
</commit_message>
<xml_diff>
--- a/Documentation_session1/Affiche_Vers_de_Terre.pptx
+++ b/Documentation_session1/Affiche_Vers_de_Terre.pptx
@@ -922,7 +922,7 @@
           <a:p>
             <a:fld id="{727551F4-315A-484B-8908-E1F288564963}" type="datetimeFigureOut">
               <a:rPr lang="en-CA" smtClean="0"/>
-              <a:t>2022-12-12</a:t>
+              <a:t>2023-01-19</a:t>
             </a:fld>
             <a:endParaRPr lang="en-CA"/>
           </a:p>
@@ -976,7 +976,7 @@
           <a:p>
             <a:fld id="{9F420531-9344-41F0-B57B-12F45AEBCD3E}" type="slidenum">
               <a:rPr lang="en-CA" smtClean="0"/>
-              <a:t>‹#›</a:t>
+              <a:t>‹N°›</a:t>
             </a:fld>
             <a:endParaRPr lang="en-CA"/>
           </a:p>
@@ -1122,7 +1122,7 @@
           <a:p>
             <a:fld id="{727551F4-315A-484B-8908-E1F288564963}" type="datetimeFigureOut">
               <a:rPr lang="en-CA" smtClean="0"/>
-              <a:t>2022-12-12</a:t>
+              <a:t>2023-01-19</a:t>
             </a:fld>
             <a:endParaRPr lang="en-CA"/>
           </a:p>
@@ -1176,7 +1176,7 @@
           <a:p>
             <a:fld id="{9F420531-9344-41F0-B57B-12F45AEBCD3E}" type="slidenum">
               <a:rPr lang="en-CA" smtClean="0"/>
-              <a:t>‹#›</a:t>
+              <a:t>‹N°›</a:t>
             </a:fld>
             <a:endParaRPr lang="en-CA"/>
           </a:p>
@@ -1332,7 +1332,7 @@
           <a:p>
             <a:fld id="{727551F4-315A-484B-8908-E1F288564963}" type="datetimeFigureOut">
               <a:rPr lang="en-CA" smtClean="0"/>
-              <a:t>2022-12-12</a:t>
+              <a:t>2023-01-19</a:t>
             </a:fld>
             <a:endParaRPr lang="en-CA"/>
           </a:p>
@@ -1386,7 +1386,7 @@
           <a:p>
             <a:fld id="{9F420531-9344-41F0-B57B-12F45AEBCD3E}" type="slidenum">
               <a:rPr lang="en-CA" smtClean="0"/>
-              <a:t>‹#›</a:t>
+              <a:t>‹N°›</a:t>
             </a:fld>
             <a:endParaRPr lang="en-CA"/>
           </a:p>
@@ -1532,7 +1532,7 @@
           <a:p>
             <a:fld id="{727551F4-315A-484B-8908-E1F288564963}" type="datetimeFigureOut">
               <a:rPr lang="en-CA" smtClean="0"/>
-              <a:t>2022-12-12</a:t>
+              <a:t>2023-01-19</a:t>
             </a:fld>
             <a:endParaRPr lang="en-CA"/>
           </a:p>
@@ -1586,7 +1586,7 @@
           <a:p>
             <a:fld id="{9F420531-9344-41F0-B57B-12F45AEBCD3E}" type="slidenum">
               <a:rPr lang="en-CA" smtClean="0"/>
-              <a:t>‹#›</a:t>
+              <a:t>‹N°›</a:t>
             </a:fld>
             <a:endParaRPr lang="en-CA"/>
           </a:p>
@@ -1808,7 +1808,7 @@
           <a:p>
             <a:fld id="{727551F4-315A-484B-8908-E1F288564963}" type="datetimeFigureOut">
               <a:rPr lang="en-CA" smtClean="0"/>
-              <a:t>2022-12-12</a:t>
+              <a:t>2023-01-19</a:t>
             </a:fld>
             <a:endParaRPr lang="en-CA"/>
           </a:p>
@@ -1862,7 +1862,7 @@
           <a:p>
             <a:fld id="{9F420531-9344-41F0-B57B-12F45AEBCD3E}" type="slidenum">
               <a:rPr lang="en-CA" smtClean="0"/>
-              <a:t>‹#›</a:t>
+              <a:t>‹N°›</a:t>
             </a:fld>
             <a:endParaRPr lang="en-CA"/>
           </a:p>
@@ -2076,7 +2076,7 @@
           <a:p>
             <a:fld id="{727551F4-315A-484B-8908-E1F288564963}" type="datetimeFigureOut">
               <a:rPr lang="en-CA" smtClean="0"/>
-              <a:t>2022-12-12</a:t>
+              <a:t>2023-01-19</a:t>
             </a:fld>
             <a:endParaRPr lang="en-CA"/>
           </a:p>
@@ -2130,7 +2130,7 @@
           <a:p>
             <a:fld id="{9F420531-9344-41F0-B57B-12F45AEBCD3E}" type="slidenum">
               <a:rPr lang="en-CA" smtClean="0"/>
-              <a:t>‹#›</a:t>
+              <a:t>‹N°›</a:t>
             </a:fld>
             <a:endParaRPr lang="en-CA"/>
           </a:p>
@@ -2491,7 +2491,7 @@
           <a:p>
             <a:fld id="{727551F4-315A-484B-8908-E1F288564963}" type="datetimeFigureOut">
               <a:rPr lang="en-CA" smtClean="0"/>
-              <a:t>2022-12-12</a:t>
+              <a:t>2023-01-19</a:t>
             </a:fld>
             <a:endParaRPr lang="en-CA"/>
           </a:p>
@@ -2545,7 +2545,7 @@
           <a:p>
             <a:fld id="{9F420531-9344-41F0-B57B-12F45AEBCD3E}" type="slidenum">
               <a:rPr lang="en-CA" smtClean="0"/>
-              <a:t>‹#›</a:t>
+              <a:t>‹N°›</a:t>
             </a:fld>
             <a:endParaRPr lang="en-CA"/>
           </a:p>
@@ -2633,7 +2633,7 @@
           <a:p>
             <a:fld id="{727551F4-315A-484B-8908-E1F288564963}" type="datetimeFigureOut">
               <a:rPr lang="en-CA" smtClean="0"/>
-              <a:t>2022-12-12</a:t>
+              <a:t>2023-01-19</a:t>
             </a:fld>
             <a:endParaRPr lang="en-CA"/>
           </a:p>
@@ -2687,7 +2687,7 @@
           <a:p>
             <a:fld id="{9F420531-9344-41F0-B57B-12F45AEBCD3E}" type="slidenum">
               <a:rPr lang="en-CA" smtClean="0"/>
-              <a:t>‹#›</a:t>
+              <a:t>‹N°›</a:t>
             </a:fld>
             <a:endParaRPr lang="en-CA"/>
           </a:p>
@@ -2746,7 +2746,7 @@
           <a:p>
             <a:fld id="{727551F4-315A-484B-8908-E1F288564963}" type="datetimeFigureOut">
               <a:rPr lang="en-CA" smtClean="0"/>
-              <a:t>2022-12-12</a:t>
+              <a:t>2023-01-19</a:t>
             </a:fld>
             <a:endParaRPr lang="en-CA"/>
           </a:p>
@@ -2800,7 +2800,7 @@
           <a:p>
             <a:fld id="{9F420531-9344-41F0-B57B-12F45AEBCD3E}" type="slidenum">
               <a:rPr lang="en-CA" smtClean="0"/>
-              <a:t>‹#›</a:t>
+              <a:t>‹N°›</a:t>
             </a:fld>
             <a:endParaRPr lang="en-CA"/>
           </a:p>
@@ -3059,7 +3059,7 @@
           <a:p>
             <a:fld id="{727551F4-315A-484B-8908-E1F288564963}" type="datetimeFigureOut">
               <a:rPr lang="en-CA" smtClean="0"/>
-              <a:t>2022-12-12</a:t>
+              <a:t>2023-01-19</a:t>
             </a:fld>
             <a:endParaRPr lang="en-CA"/>
           </a:p>
@@ -3113,7 +3113,7 @@
           <a:p>
             <a:fld id="{9F420531-9344-41F0-B57B-12F45AEBCD3E}" type="slidenum">
               <a:rPr lang="en-CA" smtClean="0"/>
-              <a:t>‹#›</a:t>
+              <a:t>‹N°›</a:t>
             </a:fld>
             <a:endParaRPr lang="en-CA"/>
           </a:p>
@@ -3348,7 +3348,7 @@
           <a:p>
             <a:fld id="{727551F4-315A-484B-8908-E1F288564963}" type="datetimeFigureOut">
               <a:rPr lang="en-CA" smtClean="0"/>
-              <a:t>2022-12-12</a:t>
+              <a:t>2023-01-19</a:t>
             </a:fld>
             <a:endParaRPr lang="en-CA"/>
           </a:p>
@@ -3402,7 +3402,7 @@
           <a:p>
             <a:fld id="{9F420531-9344-41F0-B57B-12F45AEBCD3E}" type="slidenum">
               <a:rPr lang="en-CA" smtClean="0"/>
-              <a:t>‹#›</a:t>
+              <a:t>‹N°›</a:t>
             </a:fld>
             <a:endParaRPr lang="en-CA"/>
           </a:p>
@@ -3591,7 +3591,7 @@
           <a:p>
             <a:fld id="{727551F4-315A-484B-8908-E1F288564963}" type="datetimeFigureOut">
               <a:rPr lang="en-CA" smtClean="0"/>
-              <a:t>2022-12-12</a:t>
+              <a:t>2023-01-19</a:t>
             </a:fld>
             <a:endParaRPr lang="en-CA"/>
           </a:p>
@@ -3681,7 +3681,7 @@
           <a:p>
             <a:fld id="{9F420531-9344-41F0-B57B-12F45AEBCD3E}" type="slidenum">
               <a:rPr lang="en-CA" smtClean="0"/>
-              <a:t>‹#›</a:t>
+              <a:t>‹N°›</a:t>
             </a:fld>
             <a:endParaRPr lang="en-CA"/>
           </a:p>
@@ -4479,7 +4479,7 @@
         <p:spPr>
           <a:xfrm>
             <a:off x="174512" y="1516067"/>
-            <a:ext cx="7024423" cy="1323439"/>
+            <a:ext cx="8416920" cy="1323439"/>
           </a:xfrm>
           <a:prstGeom prst="rect">
             <a:avLst/>
@@ -4498,7 +4498,7 @@
             </a:pPr>
             <a:r>
               <a:rPr lang="fr-CA" sz="2000" dirty="0"/>
-              <a:t>Capter les vibrations des vers de terres dans le sol.</a:t>
+              <a:t>Capter les vibrations des insectes (notamment les vers de terres) dans le sol.</a:t>
             </a:r>
           </a:p>
           <a:p>
@@ -4908,21 +4908,6 @@
 </file>
 
 <file path=customXml/item1.xml><?xml version="1.0" encoding="utf-8"?>
-<?mso-contentType ?>
-<FormTemplates xmlns="http://schemas.microsoft.com/sharepoint/v3/contenttype/forms">
-  <Display>DocumentLibraryForm</Display>
-  <Edit>DocumentLibraryForm</Edit>
-  <New>DocumentLibraryForm</New>
-</FormTemplates>
-</file>
-
-<file path=customXml/item2.xml><?xml version="1.0" encoding="utf-8"?>
-<p:properties xmlns:p="http://schemas.microsoft.com/office/2006/metadata/properties" xmlns:xsi="http://www.w3.org/2001/XMLSchema-instance" xmlns:pc="http://schemas.microsoft.com/office/infopath/2007/PartnerControls">
-  <documentManagement/>
-</p:properties>
-</file>
-
-<file path=customXml/item3.xml><?xml version="1.0" encoding="utf-8"?>
 <ct:contentTypeSchema xmlns:ct="http://schemas.microsoft.com/office/2006/metadata/contentType" xmlns:ma="http://schemas.microsoft.com/office/2006/metadata/properties/metaAttributes" ct:_="" ma:_="" ma:contentTypeName="Document" ma:contentTypeID="0x01010099CCD8DD78CB75478FB7A49606877AA1" ma:contentTypeVersion="2" ma:contentTypeDescription="Crée un document." ma:contentTypeScope="" ma:versionID="570ed97949499d51fb54282d4f846607">
   <xsd:schema xmlns:xsd="http://www.w3.org/2001/XMLSchema" xmlns:xs="http://www.w3.org/2001/XMLSchema" xmlns:p="http://schemas.microsoft.com/office/2006/metadata/properties" xmlns:ns2="59f032a8-2326-4110-a897-48ad6ab7eae4" targetNamespace="http://schemas.microsoft.com/office/2006/metadata/properties" ma:root="true" ma:fieldsID="21effdd2c027ecc8accaa3d55487f04b" ns2:_="">
     <xsd:import namespace="59f032a8-2326-4110-a897-48ad6ab7eae4"/>
@@ -5054,10 +5039,35 @@
 </ct:contentTypeSchema>
 </file>
 
+<file path=customXml/item2.xml><?xml version="1.0" encoding="utf-8"?>
+<p:properties xmlns:p="http://schemas.microsoft.com/office/2006/metadata/properties" xmlns:xsi="http://www.w3.org/2001/XMLSchema-instance" xmlns:pc="http://schemas.microsoft.com/office/infopath/2007/PartnerControls">
+  <documentManagement/>
+</p:properties>
+</file>
+
+<file path=customXml/item3.xml><?xml version="1.0" encoding="utf-8"?>
+<?mso-contentType ?>
+<FormTemplates xmlns="http://schemas.microsoft.com/sharepoint/v3/contenttype/forms">
+  <Display>DocumentLibraryForm</Display>
+  <Edit>DocumentLibraryForm</Edit>
+  <New>DocumentLibraryForm</New>
+</FormTemplates>
+</file>
+
 <file path=customXml/itemProps1.xml><?xml version="1.0" encoding="utf-8"?>
-<ds:datastoreItem xmlns:ds="http://schemas.openxmlformats.org/officeDocument/2006/customXml" ds:itemID="{2E56EE44-5B78-49A0-A0B6-495BE0FAC310}">
+<ds:datastoreItem xmlns:ds="http://schemas.openxmlformats.org/officeDocument/2006/customXml" ds:itemID="{EEF19040-0F06-453E-B3D8-DCE64896781B}">
   <ds:schemaRefs>
-    <ds:schemaRef ds:uri="http://schemas.microsoft.com/sharepoint/v3/contenttype/forms"/>
+    <ds:schemaRef ds:uri="http://schemas.microsoft.com/office/2006/metadata/contentType"/>
+    <ds:schemaRef ds:uri="http://schemas.microsoft.com/office/2006/metadata/properties/metaAttributes"/>
+    <ds:schemaRef ds:uri="http://www.w3.org/2001/XMLSchema"/>
+    <ds:schemaRef ds:uri="http://schemas.microsoft.com/office/2006/metadata/properties"/>
+    <ds:schemaRef ds:uri="59f032a8-2326-4110-a897-48ad6ab7eae4"/>
+    <ds:schemaRef ds:uri="http://schemas.microsoft.com/office/2006/documentManagement/types"/>
+    <ds:schemaRef ds:uri="http://schemas.microsoft.com/office/infopath/2007/PartnerControls"/>
+    <ds:schemaRef ds:uri="http://schemas.openxmlformats.org/package/2006/metadata/core-properties"/>
+    <ds:schemaRef ds:uri="http://purl.org/dc/elements/1.1/"/>
+    <ds:schemaRef ds:uri="http://purl.org/dc/terms/"/>
+    <ds:schemaRef ds:uri="http://schemas.microsoft.com/internal/obd"/>
   </ds:schemaRefs>
 </ds:datastoreItem>
 </file>
@@ -5079,19 +5089,9 @@
 </file>
 
 <file path=customXml/itemProps3.xml><?xml version="1.0" encoding="utf-8"?>
-<ds:datastoreItem xmlns:ds="http://schemas.openxmlformats.org/officeDocument/2006/customXml" ds:itemID="{EEF19040-0F06-453E-B3D8-DCE64896781B}">
+<ds:datastoreItem xmlns:ds="http://schemas.openxmlformats.org/officeDocument/2006/customXml" ds:itemID="{2E56EE44-5B78-49A0-A0B6-495BE0FAC310}">
   <ds:schemaRefs>
-    <ds:schemaRef ds:uri="http://schemas.microsoft.com/office/2006/metadata/contentType"/>
-    <ds:schemaRef ds:uri="http://schemas.microsoft.com/office/2006/metadata/properties/metaAttributes"/>
-    <ds:schemaRef ds:uri="http://www.w3.org/2001/XMLSchema"/>
-    <ds:schemaRef ds:uri="http://schemas.microsoft.com/office/2006/metadata/properties"/>
-    <ds:schemaRef ds:uri="59f032a8-2326-4110-a897-48ad6ab7eae4"/>
-    <ds:schemaRef ds:uri="http://schemas.microsoft.com/office/2006/documentManagement/types"/>
-    <ds:schemaRef ds:uri="http://schemas.microsoft.com/office/infopath/2007/PartnerControls"/>
-    <ds:schemaRef ds:uri="http://schemas.openxmlformats.org/package/2006/metadata/core-properties"/>
-    <ds:schemaRef ds:uri="http://purl.org/dc/elements/1.1/"/>
-    <ds:schemaRef ds:uri="http://purl.org/dc/terms/"/>
-    <ds:schemaRef ds:uri="http://schemas.microsoft.com/internal/obd"/>
+    <ds:schemaRef ds:uri="http://schemas.microsoft.com/sharepoint/v3/contenttype/forms"/>
   </ds:schemaRefs>
 </ds:datastoreItem>
 </file>
</xml_diff>